<commit_message>
·rd chaptter finished before the 5th meeting
</commit_message>
<xml_diff>
--- a/TFG_Documentation/IMS_and_DMS.pptx
+++ b/TFG_Documentation/IMS_and_DMS.pptx
@@ -255,7 +255,7 @@
           <a:p>
             <a:fld id="{FCBE1C83-CC4A-47E8-ACD4-35DD6995109C}" type="datetimeFigureOut">
               <a:rPr lang="es-ES" smtClean="0"/>
-              <a:t>21/07/2024</a:t>
+              <a:t>23/07/2024</a:t>
             </a:fld>
             <a:endParaRPr lang="es-ES"/>
           </a:p>
@@ -425,7 +425,7 @@
           <a:p>
             <a:fld id="{FCBE1C83-CC4A-47E8-ACD4-35DD6995109C}" type="datetimeFigureOut">
               <a:rPr lang="es-ES" smtClean="0"/>
-              <a:t>21/07/2024</a:t>
+              <a:t>23/07/2024</a:t>
             </a:fld>
             <a:endParaRPr lang="es-ES"/>
           </a:p>
@@ -605,7 +605,7 @@
           <a:p>
             <a:fld id="{FCBE1C83-CC4A-47E8-ACD4-35DD6995109C}" type="datetimeFigureOut">
               <a:rPr lang="es-ES" smtClean="0"/>
-              <a:t>21/07/2024</a:t>
+              <a:t>23/07/2024</a:t>
             </a:fld>
             <a:endParaRPr lang="es-ES"/>
           </a:p>
@@ -775,7 +775,7 @@
           <a:p>
             <a:fld id="{FCBE1C83-CC4A-47E8-ACD4-35DD6995109C}" type="datetimeFigureOut">
               <a:rPr lang="es-ES" smtClean="0"/>
-              <a:t>21/07/2024</a:t>
+              <a:t>23/07/2024</a:t>
             </a:fld>
             <a:endParaRPr lang="es-ES"/>
           </a:p>
@@ -1021,7 +1021,7 @@
           <a:p>
             <a:fld id="{FCBE1C83-CC4A-47E8-ACD4-35DD6995109C}" type="datetimeFigureOut">
               <a:rPr lang="es-ES" smtClean="0"/>
-              <a:t>21/07/2024</a:t>
+              <a:t>23/07/2024</a:t>
             </a:fld>
             <a:endParaRPr lang="es-ES"/>
           </a:p>
@@ -1253,7 +1253,7 @@
           <a:p>
             <a:fld id="{FCBE1C83-CC4A-47E8-ACD4-35DD6995109C}" type="datetimeFigureOut">
               <a:rPr lang="es-ES" smtClean="0"/>
-              <a:t>21/07/2024</a:t>
+              <a:t>23/07/2024</a:t>
             </a:fld>
             <a:endParaRPr lang="es-ES"/>
           </a:p>
@@ -1620,7 +1620,7 @@
           <a:p>
             <a:fld id="{FCBE1C83-CC4A-47E8-ACD4-35DD6995109C}" type="datetimeFigureOut">
               <a:rPr lang="es-ES" smtClean="0"/>
-              <a:t>21/07/2024</a:t>
+              <a:t>23/07/2024</a:t>
             </a:fld>
             <a:endParaRPr lang="es-ES"/>
           </a:p>
@@ -1738,7 +1738,7 @@
           <a:p>
             <a:fld id="{FCBE1C83-CC4A-47E8-ACD4-35DD6995109C}" type="datetimeFigureOut">
               <a:rPr lang="es-ES" smtClean="0"/>
-              <a:t>21/07/2024</a:t>
+              <a:t>23/07/2024</a:t>
             </a:fld>
             <a:endParaRPr lang="es-ES"/>
           </a:p>
@@ -1833,7 +1833,7 @@
           <a:p>
             <a:fld id="{FCBE1C83-CC4A-47E8-ACD4-35DD6995109C}" type="datetimeFigureOut">
               <a:rPr lang="es-ES" smtClean="0"/>
-              <a:t>21/07/2024</a:t>
+              <a:t>23/07/2024</a:t>
             </a:fld>
             <a:endParaRPr lang="es-ES"/>
           </a:p>
@@ -2110,7 +2110,7 @@
           <a:p>
             <a:fld id="{FCBE1C83-CC4A-47E8-ACD4-35DD6995109C}" type="datetimeFigureOut">
               <a:rPr lang="es-ES" smtClean="0"/>
-              <a:t>21/07/2024</a:t>
+              <a:t>23/07/2024</a:t>
             </a:fld>
             <a:endParaRPr lang="es-ES"/>
           </a:p>
@@ -2367,7 +2367,7 @@
           <a:p>
             <a:fld id="{FCBE1C83-CC4A-47E8-ACD4-35DD6995109C}" type="datetimeFigureOut">
               <a:rPr lang="es-ES" smtClean="0"/>
-              <a:t>21/07/2024</a:t>
+              <a:t>23/07/2024</a:t>
             </a:fld>
             <a:endParaRPr lang="es-ES"/>
           </a:p>
@@ -2580,7 +2580,7 @@
           <a:p>
             <a:fld id="{FCBE1C83-CC4A-47E8-ACD4-35DD6995109C}" type="datetimeFigureOut">
               <a:rPr lang="es-ES" smtClean="0"/>
-              <a:t>21/07/2024</a:t>
+              <a:t>23/07/2024</a:t>
             </a:fld>
             <a:endParaRPr lang="es-ES"/>
           </a:p>
@@ -6428,7 +6428,7 @@
           <a:noFill/>
           <a:ln w="38100" cap="rnd">
             <a:solidFill>
-              <a:schemeClr val="accent3">
+              <a:schemeClr val="accent2">
                 <a:lumMod val="50000"/>
               </a:schemeClr>
             </a:solidFill>
@@ -8764,7 +8764,7 @@
           <a:noFill/>
           <a:ln w="38100" cap="rnd">
             <a:solidFill>
-              <a:schemeClr val="accent3">
+              <a:schemeClr val="accent4">
                 <a:lumMod val="50000"/>
               </a:schemeClr>
             </a:solidFill>
@@ -8820,7 +8820,7 @@
           <a:noFill/>
           <a:ln w="38100" cap="rnd">
             <a:solidFill>
-              <a:schemeClr val="accent3">
+              <a:schemeClr val="accent6">
                 <a:lumMod val="50000"/>
               </a:schemeClr>
             </a:solidFill>

</xml_diff>